<commit_message>
prefix, suffix 규칙 구현
</commit_message>
<xml_diff>
--- a/inflearn01/doc/내가만든코드는개발테스트운영에서작동합니다.pptx
+++ b/inflearn01/doc/내가만든코드는개발테스트운영에서작동합니다.pptx
@@ -15515,7 +15515,7 @@
         </p:spPr>
         <p:txBody>
           <a:bodyPr>
-            <a:normAutofit/>
+            <a:normAutofit fontScale="92500" lnSpcReduction="10000"/>
           </a:bodyPr>
           <a:lstStyle/>
           <a:p>
@@ -15610,11 +15610,15 @@
             </a:r>
             <a:r>
               <a:rPr lang="ko-KR" altLang="en-US"/>
-              <a:t>컨테이너 식별자 </a:t>
-            </a:r>
-            <a:r>
-              <a:rPr lang="ko-KR" altLang="en-US" dirty="0"/>
-              <a:t>필요</a:t>
+              <a:t>컨테이너 식별자 필요</a:t>
+            </a:r>
+            <a:endParaRPr lang="en-US" altLang="ko-KR"/>
+          </a:p>
+          <a:p>
+            <a:pPr lvl="1"/>
+            <a:r>
+              <a:rPr lang="ko-KR" altLang="en-US"/>
+              <a:t>배치프로그램</a:t>
             </a:r>
             <a:endParaRPr lang="en-US" altLang="ko-KR" dirty="0"/>
           </a:p>
@@ -17747,6 +17751,28 @@
             <a:endParaRPr lang="en-US" altLang="ko-KR"/>
           </a:p>
           <a:p>
+            <a:pPr lvl="1"/>
+            <a:endParaRPr lang="en-US" altLang="ko-KR"/>
+          </a:p>
+          <a:p>
+            <a:pPr lvl="1"/>
+            <a:r>
+              <a:rPr lang="ko-KR" altLang="en-US"/>
+              <a:t>하드코딩</a:t>
+            </a:r>
+            <a:endParaRPr lang="en-US" altLang="ko-KR"/>
+          </a:p>
+          <a:p>
+            <a:pPr marL="274320" lvl="1" indent="0">
+              <a:buNone/>
+            </a:pPr>
+            <a:endParaRPr lang="en-US" altLang="ko-KR"/>
+          </a:p>
+          <a:p>
+            <a:pPr lvl="1"/>
+            <a:endParaRPr lang="en-US" altLang="ko-KR"/>
+          </a:p>
+          <a:p>
             <a:endParaRPr lang="ko-KR" altLang="en-US" dirty="0"/>
           </a:p>
         </p:txBody>
@@ -17773,8 +17799,8 @@
         </p:blipFill>
         <p:spPr>
           <a:xfrm>
-            <a:off x="1369108" y="3932643"/>
-            <a:ext cx="6982799" cy="828791"/>
+            <a:off x="1547134" y="3914923"/>
+            <a:ext cx="5187988" cy="746089"/>
           </a:xfrm>
           <a:prstGeom prst="rect">
             <a:avLst/>
@@ -17803,8 +17829,8 @@
         </p:blipFill>
         <p:spPr>
           <a:xfrm>
-            <a:off x="3646549" y="5048607"/>
-            <a:ext cx="7306695" cy="838317"/>
+            <a:off x="6420838" y="3931541"/>
+            <a:ext cx="5771162" cy="746089"/>
           </a:xfrm>
           <a:prstGeom prst="rect">
             <a:avLst/>
@@ -17878,10 +17904,10 @@
       </p:sp>
       <p:sp>
         <p:nvSpPr>
-          <p:cNvPr id="8" name="TextBox 7">
+          <p:cNvPr id="9" name="TextBox 8">
             <a:extLst>
               <a:ext uri="{FF2B5EF4-FFF2-40B4-BE49-F238E27FC236}">
-                <a16:creationId xmlns:a16="http://schemas.microsoft.com/office/drawing/2014/main" id="{F2186825-4087-4D0E-B0ED-49ED1CB6D0ED}"/>
+                <a16:creationId xmlns:a16="http://schemas.microsoft.com/office/drawing/2014/main" id="{E02EC9BA-FA96-4BC9-974A-FC6AB31402F6}"/>
               </a:ext>
             </a:extLst>
           </p:cNvPr>
@@ -17890,8 +17916,8 @@
         </p:nvSpPr>
         <p:spPr>
           <a:xfrm>
-            <a:off x="3642993" y="4722319"/>
-            <a:ext cx="2435028" cy="369332"/>
+            <a:off x="1708997" y="5118997"/>
+            <a:ext cx="8211838" cy="646331"/>
           </a:xfrm>
           <a:prstGeom prst="rect">
             <a:avLst/>
@@ -17905,19 +17931,17 @@
           <a:lstStyle/>
           <a:p>
             <a:r>
-              <a:rPr lang="en-US" altLang="ko-KR" sz="1800">
-                <a:solidFill>
-                  <a:schemeClr val="accent1"/>
-                </a:solidFill>
-                <a:latin typeface="Consolas" panose="020B0609020204030204" pitchFamily="49" charset="0"/>
-              </a:rPr>
-              <a:t>- InitYaml.java</a:t>
-            </a:r>
-            <a:endParaRPr lang="ko-KR" altLang="en-US" dirty="0">
-              <a:solidFill>
-                <a:schemeClr val="accent1"/>
-              </a:solidFill>
-            </a:endParaRPr>
+              <a:rPr lang="en-US" altLang="ko-KR"/>
+              <a:t>InitYaml.get().setAppName(InitCode5DBByDev.class.getName());</a:t>
+            </a:r>
+            <a:endParaRPr lang="ko-KR" altLang="en-US"/>
+          </a:p>
+          <a:p>
+            <a:r>
+              <a:rPr lang="ko-KR" altLang="en-US"/>
+              <a:t> </a:t>
+            </a:r>
+            <a:endParaRPr lang="ko-KR" altLang="en-US" dirty="0"/>
           </a:p>
         </p:txBody>
       </p:sp>

</xml_diff>